<commit_message>
now with a tank factory
</commit_message>
<xml_diff>
--- a/6044_FramPat/D2D/INFO_6044_Patterns (live document).pptx
+++ b/6044_FramPat/D2D/INFO_6044_Patterns (live document).pptx
@@ -5,12 +5,16 @@
     <p:sldMasterId id="2147483892" r:id="rId1"/>
   </p:sldMasterIdLst>
   <p:notesMasterIdLst>
-    <p:notesMasterId r:id="rId5"/>
+    <p:notesMasterId r:id="rId9"/>
   </p:notesMasterIdLst>
   <p:sldIdLst>
     <p:sldId id="256" r:id="rId2"/>
     <p:sldId id="296" r:id="rId3"/>
     <p:sldId id="323" r:id="rId4"/>
+    <p:sldId id="324" r:id="rId5"/>
+    <p:sldId id="325" r:id="rId6"/>
+    <p:sldId id="326" r:id="rId7"/>
+    <p:sldId id="327" r:id="rId8"/>
   </p:sldIdLst>
   <p:sldSz cx="9144000" cy="5143500" type="screen16x9"/>
   <p:notesSz cx="6858000" cy="9144000"/>
@@ -6960,6 +6964,12 @@
             </a:r>
           </a:p>
           <a:p>
+            <a:r>
+              <a:rPr lang="en-CA" dirty="0"/>
+              <a:t>Singleton</a:t>
+            </a:r>
+          </a:p>
+          <a:p>
             <a:pPr lvl="1"/>
             <a:endParaRPr lang="en-CA" dirty="0"/>
           </a:p>
@@ -7096,7 +7106,7 @@
                             </p:stCondLst>
                             <p:childTnLst>
                               <p:par>
-                                <p:cTn id="10" presetID="10" presetClass="entr" presetSubtype="0" fill="hold" grpId="0" nodeType="clickEffect">
+                                <p:cTn id="10" presetID="5" presetClass="entr" presetSubtype="10" fill="hold" grpId="0" nodeType="clickEffect">
                                   <p:stCondLst>
                                     <p:cond delay="0"/>
                                   </p:stCondLst>
@@ -7104,6 +7114,67 @@
                                     <p:set>
                                       <p:cBhvr>
                                         <p:cTn id="11" dur="1" fill="hold">
+                                          <p:stCondLst>
+                                            <p:cond delay="0"/>
+                                          </p:stCondLst>
+                                        </p:cTn>
+                                        <p:tgtEl>
+                                          <p:spTgt spid="3">
+                                            <p:txEl>
+                                              <p:pRg st="1" end="1"/>
+                                            </p:txEl>
+                                          </p:spTgt>
+                                        </p:tgtEl>
+                                        <p:attrNameLst>
+                                          <p:attrName>style.visibility</p:attrName>
+                                        </p:attrNameLst>
+                                      </p:cBhvr>
+                                      <p:to>
+                                        <p:strVal val="visible"/>
+                                      </p:to>
+                                    </p:set>
+                                    <p:animEffect transition="in" filter="checkerboard(across)">
+                                      <p:cBhvr>
+                                        <p:cTn id="12" dur="500"/>
+                                        <p:tgtEl>
+                                          <p:spTgt spid="3">
+                                            <p:txEl>
+                                              <p:pRg st="1" end="1"/>
+                                            </p:txEl>
+                                          </p:spTgt>
+                                        </p:tgtEl>
+                                      </p:cBhvr>
+                                    </p:animEffect>
+                                  </p:childTnLst>
+                                </p:cTn>
+                              </p:par>
+                            </p:childTnLst>
+                          </p:cTn>
+                        </p:par>
+                      </p:childTnLst>
+                    </p:cTn>
+                  </p:par>
+                  <p:par>
+                    <p:cTn id="13" fill="hold">
+                      <p:stCondLst>
+                        <p:cond delay="indefinite"/>
+                      </p:stCondLst>
+                      <p:childTnLst>
+                        <p:par>
+                          <p:cTn id="14" fill="hold">
+                            <p:stCondLst>
+                              <p:cond delay="0"/>
+                            </p:stCondLst>
+                            <p:childTnLst>
+                              <p:par>
+                                <p:cTn id="15" presetID="10" presetClass="entr" presetSubtype="0" fill="hold" grpId="0" nodeType="clickEffect">
+                                  <p:stCondLst>
+                                    <p:cond delay="0"/>
+                                  </p:stCondLst>
+                                  <p:childTnLst>
+                                    <p:set>
+                                      <p:cBhvr>
+                                        <p:cTn id="16" dur="1" fill="hold">
                                           <p:stCondLst>
                                             <p:cond delay="0"/>
                                           </p:stCondLst>
@@ -7121,7 +7192,7 @@
                                     </p:set>
                                     <p:animEffect transition="in" filter="fade">
                                       <p:cBhvr>
-                                        <p:cTn id="12" dur="500"/>
+                                        <p:cTn id="17" dur="500"/>
                                         <p:tgtEl>
                                           <p:spTgt spid="4"/>
                                         </p:tgtEl>
@@ -7347,6 +7418,1018 @@
     <p:extLst>
       <p:ext uri="{BB962C8B-B14F-4D97-AF65-F5344CB8AC3E}">
         <p14:creationId xmlns:p14="http://schemas.microsoft.com/office/powerpoint/2010/main" val="4189321164"/>
+      </p:ext>
+    </p:extLst>
+  </p:cSld>
+  <p:clrMapOvr>
+    <a:masterClrMapping/>
+  </p:clrMapOvr>
+  <p:timing>
+    <p:tnLst>
+      <p:par>
+        <p:cTn id="1" dur="indefinite" restart="never" nodeType="tmRoot">
+          <p:childTnLst>
+            <p:seq concurrent="1" nextAc="seek">
+              <p:cTn id="2" dur="indefinite" nodeType="mainSeq">
+                <p:childTnLst>
+                  <p:par>
+                    <p:cTn id="3" fill="hold">
+                      <p:stCondLst>
+                        <p:cond delay="indefinite"/>
+                      </p:stCondLst>
+                      <p:childTnLst>
+                        <p:par>
+                          <p:cTn id="4" fill="hold">
+                            <p:stCondLst>
+                              <p:cond delay="0"/>
+                            </p:stCondLst>
+                            <p:childTnLst>
+                              <p:par>
+                                <p:cTn id="5" presetID="10" presetClass="entr" presetSubtype="0" fill="hold" grpId="0" nodeType="clickEffect">
+                                  <p:stCondLst>
+                                    <p:cond delay="0"/>
+                                  </p:stCondLst>
+                                  <p:childTnLst>
+                                    <p:set>
+                                      <p:cBhvr>
+                                        <p:cTn id="6" dur="1" fill="hold">
+                                          <p:stCondLst>
+                                            <p:cond delay="0"/>
+                                          </p:stCondLst>
+                                        </p:cTn>
+                                        <p:tgtEl>
+                                          <p:spTgt spid="4"/>
+                                        </p:tgtEl>
+                                        <p:attrNameLst>
+                                          <p:attrName>style.visibility</p:attrName>
+                                        </p:attrNameLst>
+                                      </p:cBhvr>
+                                      <p:to>
+                                        <p:strVal val="visible"/>
+                                      </p:to>
+                                    </p:set>
+                                    <p:animEffect transition="in" filter="fade">
+                                      <p:cBhvr>
+                                        <p:cTn id="7" dur="500"/>
+                                        <p:tgtEl>
+                                          <p:spTgt spid="4"/>
+                                        </p:tgtEl>
+                                      </p:cBhvr>
+                                    </p:animEffect>
+                                  </p:childTnLst>
+                                </p:cTn>
+                              </p:par>
+                            </p:childTnLst>
+                          </p:cTn>
+                        </p:par>
+                      </p:childTnLst>
+                    </p:cTn>
+                  </p:par>
+                </p:childTnLst>
+              </p:cTn>
+              <p:prevCondLst>
+                <p:cond evt="onPrev" delay="0">
+                  <p:tgtEl>
+                    <p:sldTgt/>
+                  </p:tgtEl>
+                </p:cond>
+              </p:prevCondLst>
+              <p:nextCondLst>
+                <p:cond evt="onNext" delay="0">
+                  <p:tgtEl>
+                    <p:sldTgt/>
+                  </p:tgtEl>
+                </p:cond>
+              </p:nextCondLst>
+            </p:seq>
+          </p:childTnLst>
+        </p:cTn>
+      </p:par>
+    </p:tnLst>
+    <p:bldLst>
+      <p:bldP spid="4" grpId="0" animBg="1"/>
+    </p:bldLst>
+  </p:timing>
+</p:sld>
+</file>
+
+<file path=ppt/slides/slide4.xml><?xml version="1.0" encoding="utf-8"?>
+<p:sld xmlns:a="http://schemas.openxmlformats.org/drawingml/2006/main" xmlns:r="http://schemas.openxmlformats.org/officeDocument/2006/relationships" xmlns:p="http://schemas.openxmlformats.org/presentationml/2006/main">
+  <p:cSld>
+    <p:spTree>
+      <p:nvGrpSpPr>
+        <p:cNvPr id="1" name=""/>
+        <p:cNvGrpSpPr/>
+        <p:nvPr/>
+      </p:nvGrpSpPr>
+      <p:grpSpPr>
+        <a:xfrm>
+          <a:off x="0" y="0"/>
+          <a:ext cx="0" cy="0"/>
+          <a:chOff x="0" y="0"/>
+          <a:chExt cx="0" cy="0"/>
+        </a:xfrm>
+      </p:grpSpPr>
+      <p:sp>
+        <p:nvSpPr>
+          <p:cNvPr id="2" name="Title 1"/>
+          <p:cNvSpPr>
+            <a:spLocks noGrp="1"/>
+          </p:cNvSpPr>
+          <p:nvPr>
+            <p:ph type="title"/>
+          </p:nvPr>
+        </p:nvSpPr>
+        <p:spPr>
+          <a:xfrm>
+            <a:off x="914400" y="384048"/>
+            <a:ext cx="7772400" cy="968502"/>
+          </a:xfrm>
+        </p:spPr>
+        <p:txBody>
+          <a:bodyPr/>
+          <a:lstStyle/>
+          <a:p>
+            <a:r>
+              <a:rPr lang="en-CA" dirty="0"/>
+              <a:t>Singleton</a:t>
+            </a:r>
+          </a:p>
+        </p:txBody>
+      </p:sp>
+      <p:sp>
+        <p:nvSpPr>
+          <p:cNvPr id="3" name="Content Placeholder 2"/>
+          <p:cNvSpPr>
+            <a:spLocks noGrp="1"/>
+          </p:cNvSpPr>
+          <p:nvPr>
+            <p:ph idx="1"/>
+          </p:nvPr>
+        </p:nvSpPr>
+        <p:spPr>
+          <a:xfrm>
+            <a:off x="304800" y="1428750"/>
+            <a:ext cx="8839200" cy="3337920"/>
+          </a:xfrm>
+        </p:spPr>
+        <p:txBody>
+          <a:bodyPr>
+            <a:normAutofit/>
+          </a:bodyPr>
+          <a:lstStyle/>
+          <a:p>
+            <a:r>
+              <a:rPr lang="en-CA" dirty="0"/>
+              <a:t>This is where you only want one instance</a:t>
+            </a:r>
+          </a:p>
+          <a:p>
+            <a:r>
+              <a:rPr lang="en-CA" dirty="0"/>
+              <a:t>Main way:</a:t>
+            </a:r>
+          </a:p>
+          <a:p>
+            <a:pPr lvl="1"/>
+            <a:r>
+              <a:rPr lang="en-CA" dirty="0"/>
+              <a:t>Add a constructor, make it private</a:t>
+            </a:r>
+          </a:p>
+          <a:p>
+            <a:pPr lvl="1"/>
+            <a:r>
+              <a:rPr lang="en-CA" dirty="0"/>
+              <a:t>Add a static variable of the type</a:t>
+            </a:r>
+          </a:p>
+          <a:p>
+            <a:pPr lvl="2"/>
+            <a:r>
+              <a:rPr lang="en-CA" sz="1800" dirty="0">
+                <a:solidFill>
+                  <a:srgbClr val="0000FF"/>
+                </a:solidFill>
+                <a:highlight>
+                  <a:srgbClr val="FFFFFF"/>
+                </a:highlight>
+                <a:latin typeface="Cascadia Mono" panose="020B0609020000020004" pitchFamily="49" charset="0"/>
+              </a:rPr>
+              <a:t>static</a:t>
+            </a:r>
+            <a:r>
+              <a:rPr lang="en-CA" sz="1800" dirty="0">
+                <a:solidFill>
+                  <a:srgbClr val="000000"/>
+                </a:solidFill>
+                <a:highlight>
+                  <a:srgbClr val="FFFFFF"/>
+                </a:highlight>
+                <a:latin typeface="Cascadia Mono" panose="020B0609020000020004" pitchFamily="49" charset="0"/>
+              </a:rPr>
+              <a:t> </a:t>
+            </a:r>
+            <a:r>
+              <a:rPr lang="en-CA" sz="1800" dirty="0" err="1">
+                <a:solidFill>
+                  <a:srgbClr val="2B91AF"/>
+                </a:solidFill>
+                <a:highlight>
+                  <a:srgbClr val="FFFFFF"/>
+                </a:highlight>
+                <a:latin typeface="Cascadia Mono" panose="020B0609020000020004" pitchFamily="49" charset="0"/>
+              </a:rPr>
+              <a:t>cTankFactory</a:t>
+            </a:r>
+            <a:r>
+              <a:rPr lang="en-CA" sz="1800" dirty="0">
+                <a:solidFill>
+                  <a:srgbClr val="000000"/>
+                </a:solidFill>
+                <a:highlight>
+                  <a:srgbClr val="FFFFFF"/>
+                </a:highlight>
+                <a:latin typeface="Cascadia Mono" panose="020B0609020000020004" pitchFamily="49" charset="0"/>
+              </a:rPr>
+              <a:t>* </a:t>
+            </a:r>
+            <a:r>
+              <a:rPr lang="en-CA" sz="1800" dirty="0" err="1">
+                <a:solidFill>
+                  <a:srgbClr val="000000"/>
+                </a:solidFill>
+                <a:highlight>
+                  <a:srgbClr val="FFFFFF"/>
+                </a:highlight>
+                <a:latin typeface="Cascadia Mono" panose="020B0609020000020004" pitchFamily="49" charset="0"/>
+              </a:rPr>
+              <a:t>m_pTheInstance</a:t>
+            </a:r>
+            <a:r>
+              <a:rPr lang="en-CA" sz="1800" dirty="0">
+                <a:solidFill>
+                  <a:srgbClr val="000000"/>
+                </a:solidFill>
+                <a:highlight>
+                  <a:srgbClr val="FFFFFF"/>
+                </a:highlight>
+                <a:latin typeface="Cascadia Mono" panose="020B0609020000020004" pitchFamily="49" charset="0"/>
+              </a:rPr>
+              <a:t>;</a:t>
+            </a:r>
+          </a:p>
+          <a:p>
+            <a:pPr lvl="1"/>
+            <a:r>
+              <a:rPr lang="en-CA" dirty="0"/>
+              <a:t>“static” in C++ land means the object exists all the time, and there’s only one of them</a:t>
+            </a:r>
+          </a:p>
+        </p:txBody>
+      </p:sp>
+      <p:sp>
+        <p:nvSpPr>
+          <p:cNvPr id="4" name="AutoShape 6"/>
+          <p:cNvSpPr>
+            <a:spLocks noChangeArrowheads="1"/>
+          </p:cNvSpPr>
+          <p:nvPr/>
+        </p:nvSpPr>
+        <p:spPr bwMode="auto">
+          <a:xfrm>
+            <a:off x="8534400" y="4800600"/>
+            <a:ext cx="609600" cy="342900"/>
+          </a:xfrm>
+          <a:prstGeom prst="rightArrow">
+            <a:avLst>
+              <a:gd name="adj1" fmla="val 50000"/>
+              <a:gd name="adj2" fmla="val 33333"/>
+            </a:avLst>
+          </a:prstGeom>
+          <a:noFill/>
+          <a:ln w="19050">
+            <a:solidFill>
+              <a:srgbClr val="969696"/>
+            </a:solidFill>
+            <a:miter lim="800000"/>
+            <a:headEnd/>
+            <a:tailEnd/>
+          </a:ln>
+        </p:spPr>
+        <p:txBody>
+          <a:bodyPr wrap="none" anchor="ctr"/>
+          <a:lstStyle/>
+          <a:p>
+            <a:endParaRPr lang="en-CA"/>
+          </a:p>
+        </p:txBody>
+      </p:sp>
+    </p:spTree>
+    <p:extLst>
+      <p:ext uri="{BB962C8B-B14F-4D97-AF65-F5344CB8AC3E}">
+        <p14:creationId xmlns:p14="http://schemas.microsoft.com/office/powerpoint/2010/main" val="19672034"/>
+      </p:ext>
+    </p:extLst>
+  </p:cSld>
+  <p:clrMapOvr>
+    <a:masterClrMapping/>
+  </p:clrMapOvr>
+  <p:timing>
+    <p:tnLst>
+      <p:par>
+        <p:cTn id="1" dur="indefinite" restart="never" nodeType="tmRoot">
+          <p:childTnLst>
+            <p:seq concurrent="1" nextAc="seek">
+              <p:cTn id="2" dur="indefinite" nodeType="mainSeq">
+                <p:childTnLst>
+                  <p:par>
+                    <p:cTn id="3" fill="hold">
+                      <p:stCondLst>
+                        <p:cond delay="indefinite"/>
+                      </p:stCondLst>
+                      <p:childTnLst>
+                        <p:par>
+                          <p:cTn id="4" fill="hold">
+                            <p:stCondLst>
+                              <p:cond delay="0"/>
+                            </p:stCondLst>
+                            <p:childTnLst>
+                              <p:par>
+                                <p:cTn id="5" presetID="10" presetClass="entr" presetSubtype="0" fill="hold" grpId="0" nodeType="clickEffect">
+                                  <p:stCondLst>
+                                    <p:cond delay="0"/>
+                                  </p:stCondLst>
+                                  <p:childTnLst>
+                                    <p:set>
+                                      <p:cBhvr>
+                                        <p:cTn id="6" dur="1" fill="hold">
+                                          <p:stCondLst>
+                                            <p:cond delay="0"/>
+                                          </p:stCondLst>
+                                        </p:cTn>
+                                        <p:tgtEl>
+                                          <p:spTgt spid="4"/>
+                                        </p:tgtEl>
+                                        <p:attrNameLst>
+                                          <p:attrName>style.visibility</p:attrName>
+                                        </p:attrNameLst>
+                                      </p:cBhvr>
+                                      <p:to>
+                                        <p:strVal val="visible"/>
+                                      </p:to>
+                                    </p:set>
+                                    <p:animEffect transition="in" filter="fade">
+                                      <p:cBhvr>
+                                        <p:cTn id="7" dur="500"/>
+                                        <p:tgtEl>
+                                          <p:spTgt spid="4"/>
+                                        </p:tgtEl>
+                                      </p:cBhvr>
+                                    </p:animEffect>
+                                  </p:childTnLst>
+                                </p:cTn>
+                              </p:par>
+                            </p:childTnLst>
+                          </p:cTn>
+                        </p:par>
+                      </p:childTnLst>
+                    </p:cTn>
+                  </p:par>
+                </p:childTnLst>
+              </p:cTn>
+              <p:prevCondLst>
+                <p:cond evt="onPrev" delay="0">
+                  <p:tgtEl>
+                    <p:sldTgt/>
+                  </p:tgtEl>
+                </p:cond>
+              </p:prevCondLst>
+              <p:nextCondLst>
+                <p:cond evt="onNext" delay="0">
+                  <p:tgtEl>
+                    <p:sldTgt/>
+                  </p:tgtEl>
+                </p:cond>
+              </p:nextCondLst>
+            </p:seq>
+          </p:childTnLst>
+        </p:cTn>
+      </p:par>
+    </p:tnLst>
+    <p:bldLst>
+      <p:bldP spid="4" grpId="0" animBg="1"/>
+    </p:bldLst>
+  </p:timing>
+</p:sld>
+</file>
+
+<file path=ppt/slides/slide5.xml><?xml version="1.0" encoding="utf-8"?>
+<p:sld xmlns:a="http://schemas.openxmlformats.org/drawingml/2006/main" xmlns:r="http://schemas.openxmlformats.org/officeDocument/2006/relationships" xmlns:p="http://schemas.openxmlformats.org/presentationml/2006/main">
+  <p:cSld>
+    <p:spTree>
+      <p:nvGrpSpPr>
+        <p:cNvPr id="1" name=""/>
+        <p:cNvGrpSpPr/>
+        <p:nvPr/>
+      </p:nvGrpSpPr>
+      <p:grpSpPr>
+        <a:xfrm>
+          <a:off x="0" y="0"/>
+          <a:ext cx="0" cy="0"/>
+          <a:chOff x="0" y="0"/>
+          <a:chExt cx="0" cy="0"/>
+        </a:xfrm>
+      </p:grpSpPr>
+      <p:sp>
+        <p:nvSpPr>
+          <p:cNvPr id="2" name="Title 1"/>
+          <p:cNvSpPr>
+            <a:spLocks noGrp="1"/>
+          </p:cNvSpPr>
+          <p:nvPr>
+            <p:ph type="title"/>
+          </p:nvPr>
+        </p:nvSpPr>
+        <p:spPr>
+          <a:xfrm>
+            <a:off x="914400" y="384048"/>
+            <a:ext cx="7772400" cy="968502"/>
+          </a:xfrm>
+        </p:spPr>
+        <p:txBody>
+          <a:bodyPr/>
+          <a:lstStyle/>
+          <a:p>
+            <a:r>
+              <a:rPr lang="en-CA" dirty="0"/>
+              <a:t>Singleton</a:t>
+            </a:r>
+          </a:p>
+        </p:txBody>
+      </p:sp>
+      <p:sp>
+        <p:nvSpPr>
+          <p:cNvPr id="3" name="Content Placeholder 2"/>
+          <p:cNvSpPr>
+            <a:spLocks noGrp="1"/>
+          </p:cNvSpPr>
+          <p:nvPr>
+            <p:ph idx="1"/>
+          </p:nvPr>
+        </p:nvSpPr>
+        <p:spPr>
+          <a:xfrm>
+            <a:off x="304800" y="1428750"/>
+            <a:ext cx="8839200" cy="3337920"/>
+          </a:xfrm>
+        </p:spPr>
+        <p:txBody>
+          <a:bodyPr>
+            <a:normAutofit/>
+          </a:bodyPr>
+          <a:lstStyle/>
+          <a:p>
+            <a:r>
+              <a:rPr lang="en-CA" dirty="0"/>
+              <a:t>“static” in C++ land means the object exists all the time, and there’s only one of them</a:t>
+            </a:r>
+          </a:p>
+          <a:p>
+            <a:r>
+              <a:rPr lang="en-CA" dirty="0"/>
+              <a:t>Static variables in classes exists “before” the class is created. Or even if the class </a:t>
+            </a:r>
+            <a:r>
+              <a:rPr lang="en-CA" i="1" dirty="0"/>
+              <a:t>isn’t </a:t>
+            </a:r>
+            <a:r>
+              <a:rPr lang="en-CA" dirty="0"/>
+              <a:t>created. </a:t>
+            </a:r>
+            <a:br>
+              <a:rPr lang="en-CA" dirty="0"/>
+            </a:br>
+            <a:r>
+              <a:rPr lang="en-CA" dirty="0"/>
+              <a:t>They just exist all the time.</a:t>
+            </a:r>
+          </a:p>
+        </p:txBody>
+      </p:sp>
+      <p:sp>
+        <p:nvSpPr>
+          <p:cNvPr id="4" name="AutoShape 6"/>
+          <p:cNvSpPr>
+            <a:spLocks noChangeArrowheads="1"/>
+          </p:cNvSpPr>
+          <p:nvPr/>
+        </p:nvSpPr>
+        <p:spPr bwMode="auto">
+          <a:xfrm>
+            <a:off x="8534400" y="4800600"/>
+            <a:ext cx="609600" cy="342900"/>
+          </a:xfrm>
+          <a:prstGeom prst="rightArrow">
+            <a:avLst>
+              <a:gd name="adj1" fmla="val 50000"/>
+              <a:gd name="adj2" fmla="val 33333"/>
+            </a:avLst>
+          </a:prstGeom>
+          <a:noFill/>
+          <a:ln w="19050">
+            <a:solidFill>
+              <a:srgbClr val="969696"/>
+            </a:solidFill>
+            <a:miter lim="800000"/>
+            <a:headEnd/>
+            <a:tailEnd/>
+          </a:ln>
+        </p:spPr>
+        <p:txBody>
+          <a:bodyPr wrap="none" anchor="ctr"/>
+          <a:lstStyle/>
+          <a:p>
+            <a:endParaRPr lang="en-CA"/>
+          </a:p>
+        </p:txBody>
+      </p:sp>
+    </p:spTree>
+    <p:extLst>
+      <p:ext uri="{BB962C8B-B14F-4D97-AF65-F5344CB8AC3E}">
+        <p14:creationId xmlns:p14="http://schemas.microsoft.com/office/powerpoint/2010/main" val="3852014080"/>
+      </p:ext>
+    </p:extLst>
+  </p:cSld>
+  <p:clrMapOvr>
+    <a:masterClrMapping/>
+  </p:clrMapOvr>
+  <p:timing>
+    <p:tnLst>
+      <p:par>
+        <p:cTn id="1" dur="indefinite" restart="never" nodeType="tmRoot">
+          <p:childTnLst>
+            <p:seq concurrent="1" nextAc="seek">
+              <p:cTn id="2" dur="indefinite" nodeType="mainSeq">
+                <p:childTnLst>
+                  <p:par>
+                    <p:cTn id="3" fill="hold">
+                      <p:stCondLst>
+                        <p:cond delay="indefinite"/>
+                      </p:stCondLst>
+                      <p:childTnLst>
+                        <p:par>
+                          <p:cTn id="4" fill="hold">
+                            <p:stCondLst>
+                              <p:cond delay="0"/>
+                            </p:stCondLst>
+                            <p:childTnLst>
+                              <p:par>
+                                <p:cTn id="5" presetID="10" presetClass="entr" presetSubtype="0" fill="hold" grpId="0" nodeType="clickEffect">
+                                  <p:stCondLst>
+                                    <p:cond delay="0"/>
+                                  </p:stCondLst>
+                                  <p:childTnLst>
+                                    <p:set>
+                                      <p:cBhvr>
+                                        <p:cTn id="6" dur="1" fill="hold">
+                                          <p:stCondLst>
+                                            <p:cond delay="0"/>
+                                          </p:stCondLst>
+                                        </p:cTn>
+                                        <p:tgtEl>
+                                          <p:spTgt spid="4"/>
+                                        </p:tgtEl>
+                                        <p:attrNameLst>
+                                          <p:attrName>style.visibility</p:attrName>
+                                        </p:attrNameLst>
+                                      </p:cBhvr>
+                                      <p:to>
+                                        <p:strVal val="visible"/>
+                                      </p:to>
+                                    </p:set>
+                                    <p:animEffect transition="in" filter="fade">
+                                      <p:cBhvr>
+                                        <p:cTn id="7" dur="500"/>
+                                        <p:tgtEl>
+                                          <p:spTgt spid="4"/>
+                                        </p:tgtEl>
+                                      </p:cBhvr>
+                                    </p:animEffect>
+                                  </p:childTnLst>
+                                </p:cTn>
+                              </p:par>
+                            </p:childTnLst>
+                          </p:cTn>
+                        </p:par>
+                      </p:childTnLst>
+                    </p:cTn>
+                  </p:par>
+                </p:childTnLst>
+              </p:cTn>
+              <p:prevCondLst>
+                <p:cond evt="onPrev" delay="0">
+                  <p:tgtEl>
+                    <p:sldTgt/>
+                  </p:tgtEl>
+                </p:cond>
+              </p:prevCondLst>
+              <p:nextCondLst>
+                <p:cond evt="onNext" delay="0">
+                  <p:tgtEl>
+                    <p:sldTgt/>
+                  </p:tgtEl>
+                </p:cond>
+              </p:nextCondLst>
+            </p:seq>
+          </p:childTnLst>
+        </p:cTn>
+      </p:par>
+    </p:tnLst>
+    <p:bldLst>
+      <p:bldP spid="4" grpId="0" animBg="1"/>
+    </p:bldLst>
+  </p:timing>
+</p:sld>
+</file>
+
+<file path=ppt/slides/slide6.xml><?xml version="1.0" encoding="utf-8"?>
+<p:sld xmlns:a="http://schemas.openxmlformats.org/drawingml/2006/main" xmlns:r="http://schemas.openxmlformats.org/officeDocument/2006/relationships" xmlns:p="http://schemas.openxmlformats.org/presentationml/2006/main">
+  <p:cSld>
+    <p:spTree>
+      <p:nvGrpSpPr>
+        <p:cNvPr id="1" name=""/>
+        <p:cNvGrpSpPr/>
+        <p:nvPr/>
+      </p:nvGrpSpPr>
+      <p:grpSpPr>
+        <a:xfrm>
+          <a:off x="0" y="0"/>
+          <a:ext cx="0" cy="0"/>
+          <a:chOff x="0" y="0"/>
+          <a:chExt cx="0" cy="0"/>
+        </a:xfrm>
+      </p:grpSpPr>
+      <p:sp>
+        <p:nvSpPr>
+          <p:cNvPr id="2" name="Title 1"/>
+          <p:cNvSpPr>
+            <a:spLocks noGrp="1"/>
+          </p:cNvSpPr>
+          <p:nvPr>
+            <p:ph type="title"/>
+          </p:nvPr>
+        </p:nvSpPr>
+        <p:spPr>
+          <a:xfrm>
+            <a:off x="914400" y="384048"/>
+            <a:ext cx="7772400" cy="968502"/>
+          </a:xfrm>
+        </p:spPr>
+        <p:txBody>
+          <a:bodyPr/>
+          <a:lstStyle/>
+          <a:p>
+            <a:r>
+              <a:rPr lang="en-CA" dirty="0"/>
+              <a:t>Static and non-static</a:t>
+            </a:r>
+          </a:p>
+        </p:txBody>
+      </p:sp>
+      <p:sp>
+        <p:nvSpPr>
+          <p:cNvPr id="3" name="Content Placeholder 2"/>
+          <p:cNvSpPr>
+            <a:spLocks noGrp="1"/>
+          </p:cNvSpPr>
+          <p:nvPr>
+            <p:ph idx="1"/>
+          </p:nvPr>
+        </p:nvSpPr>
+        <p:spPr>
+          <a:xfrm>
+            <a:off x="304800" y="1428750"/>
+            <a:ext cx="8839200" cy="3337920"/>
+          </a:xfrm>
+        </p:spPr>
+        <p:txBody>
+          <a:bodyPr>
+            <a:normAutofit fontScale="92500" lnSpcReduction="20000"/>
+          </a:bodyPr>
+          <a:lstStyle/>
+          <a:p>
+            <a:r>
+              <a:rPr lang="en-CA" dirty="0"/>
+              <a:t>Non-static (regular old variables) in classes are instantiated when the class is created.</a:t>
+            </a:r>
+          </a:p>
+          <a:p>
+            <a:r>
+              <a:rPr lang="en-CA" dirty="0"/>
+              <a:t>i.e. they don’t exist UNTIL an instance is.</a:t>
+            </a:r>
+          </a:p>
+          <a:p>
+            <a:r>
+              <a:rPr lang="en-CA" dirty="0"/>
+              <a:t>However, </a:t>
+            </a:r>
+            <a:r>
+              <a:rPr lang="en-CA" i="1" dirty="0"/>
+              <a:t>methods exist all the time</a:t>
+            </a:r>
+            <a:r>
+              <a:rPr lang="en-CA" dirty="0"/>
+              <a:t>, even if you don’t create the class. </a:t>
+            </a:r>
+          </a:p>
+          <a:p>
+            <a:r>
+              <a:rPr lang="en-CA" dirty="0"/>
+              <a:t>If you don’t access any non-static member variables, you can even call them! </a:t>
+            </a:r>
+          </a:p>
+          <a:p>
+            <a:r>
+              <a:rPr lang="en-CA" dirty="0"/>
+              <a:t>Static variables (and methods) are available always.</a:t>
+            </a:r>
+          </a:p>
+        </p:txBody>
+      </p:sp>
+      <p:sp>
+        <p:nvSpPr>
+          <p:cNvPr id="4" name="AutoShape 6"/>
+          <p:cNvSpPr>
+            <a:spLocks noChangeArrowheads="1"/>
+          </p:cNvSpPr>
+          <p:nvPr/>
+        </p:nvSpPr>
+        <p:spPr bwMode="auto">
+          <a:xfrm>
+            <a:off x="8534400" y="4800600"/>
+            <a:ext cx="609600" cy="342900"/>
+          </a:xfrm>
+          <a:prstGeom prst="rightArrow">
+            <a:avLst>
+              <a:gd name="adj1" fmla="val 50000"/>
+              <a:gd name="adj2" fmla="val 33333"/>
+            </a:avLst>
+          </a:prstGeom>
+          <a:noFill/>
+          <a:ln w="19050">
+            <a:solidFill>
+              <a:srgbClr val="969696"/>
+            </a:solidFill>
+            <a:miter lim="800000"/>
+            <a:headEnd/>
+            <a:tailEnd/>
+          </a:ln>
+        </p:spPr>
+        <p:txBody>
+          <a:bodyPr wrap="none" anchor="ctr"/>
+          <a:lstStyle/>
+          <a:p>
+            <a:endParaRPr lang="en-CA"/>
+          </a:p>
+        </p:txBody>
+      </p:sp>
+    </p:spTree>
+    <p:extLst>
+      <p:ext uri="{BB962C8B-B14F-4D97-AF65-F5344CB8AC3E}">
+        <p14:creationId xmlns:p14="http://schemas.microsoft.com/office/powerpoint/2010/main" val="1558503427"/>
+      </p:ext>
+    </p:extLst>
+  </p:cSld>
+  <p:clrMapOvr>
+    <a:masterClrMapping/>
+  </p:clrMapOvr>
+  <p:timing>
+    <p:tnLst>
+      <p:par>
+        <p:cTn id="1" dur="indefinite" restart="never" nodeType="tmRoot">
+          <p:childTnLst>
+            <p:seq concurrent="1" nextAc="seek">
+              <p:cTn id="2" dur="indefinite" nodeType="mainSeq">
+                <p:childTnLst>
+                  <p:par>
+                    <p:cTn id="3" fill="hold">
+                      <p:stCondLst>
+                        <p:cond delay="indefinite"/>
+                      </p:stCondLst>
+                      <p:childTnLst>
+                        <p:par>
+                          <p:cTn id="4" fill="hold">
+                            <p:stCondLst>
+                              <p:cond delay="0"/>
+                            </p:stCondLst>
+                            <p:childTnLst>
+                              <p:par>
+                                <p:cTn id="5" presetID="10" presetClass="entr" presetSubtype="0" fill="hold" grpId="0" nodeType="clickEffect">
+                                  <p:stCondLst>
+                                    <p:cond delay="0"/>
+                                  </p:stCondLst>
+                                  <p:childTnLst>
+                                    <p:set>
+                                      <p:cBhvr>
+                                        <p:cTn id="6" dur="1" fill="hold">
+                                          <p:stCondLst>
+                                            <p:cond delay="0"/>
+                                          </p:stCondLst>
+                                        </p:cTn>
+                                        <p:tgtEl>
+                                          <p:spTgt spid="4"/>
+                                        </p:tgtEl>
+                                        <p:attrNameLst>
+                                          <p:attrName>style.visibility</p:attrName>
+                                        </p:attrNameLst>
+                                      </p:cBhvr>
+                                      <p:to>
+                                        <p:strVal val="visible"/>
+                                      </p:to>
+                                    </p:set>
+                                    <p:animEffect transition="in" filter="fade">
+                                      <p:cBhvr>
+                                        <p:cTn id="7" dur="500"/>
+                                        <p:tgtEl>
+                                          <p:spTgt spid="4"/>
+                                        </p:tgtEl>
+                                      </p:cBhvr>
+                                    </p:animEffect>
+                                  </p:childTnLst>
+                                </p:cTn>
+                              </p:par>
+                            </p:childTnLst>
+                          </p:cTn>
+                        </p:par>
+                      </p:childTnLst>
+                    </p:cTn>
+                  </p:par>
+                </p:childTnLst>
+              </p:cTn>
+              <p:prevCondLst>
+                <p:cond evt="onPrev" delay="0">
+                  <p:tgtEl>
+                    <p:sldTgt/>
+                  </p:tgtEl>
+                </p:cond>
+              </p:prevCondLst>
+              <p:nextCondLst>
+                <p:cond evt="onNext" delay="0">
+                  <p:tgtEl>
+                    <p:sldTgt/>
+                  </p:tgtEl>
+                </p:cond>
+              </p:nextCondLst>
+            </p:seq>
+          </p:childTnLst>
+        </p:cTn>
+      </p:par>
+    </p:tnLst>
+    <p:bldLst>
+      <p:bldP spid="4" grpId="0" animBg="1"/>
+    </p:bldLst>
+  </p:timing>
+</p:sld>
+</file>
+
+<file path=ppt/slides/slide7.xml><?xml version="1.0" encoding="utf-8"?>
+<p:sld xmlns:a="http://schemas.openxmlformats.org/drawingml/2006/main" xmlns:r="http://schemas.openxmlformats.org/officeDocument/2006/relationships" xmlns:p="http://schemas.openxmlformats.org/presentationml/2006/main">
+  <p:cSld>
+    <p:spTree>
+      <p:nvGrpSpPr>
+        <p:cNvPr id="1" name=""/>
+        <p:cNvGrpSpPr/>
+        <p:nvPr/>
+      </p:nvGrpSpPr>
+      <p:grpSpPr>
+        <a:xfrm>
+          <a:off x="0" y="0"/>
+          <a:ext cx="0" cy="0"/>
+          <a:chOff x="0" y="0"/>
+          <a:chExt cx="0" cy="0"/>
+        </a:xfrm>
+      </p:grpSpPr>
+      <p:sp>
+        <p:nvSpPr>
+          <p:cNvPr id="2" name="Title 1"/>
+          <p:cNvSpPr>
+            <a:spLocks noGrp="1"/>
+          </p:cNvSpPr>
+          <p:nvPr>
+            <p:ph type="title"/>
+          </p:nvPr>
+        </p:nvSpPr>
+        <p:spPr>
+          <a:xfrm>
+            <a:off x="914400" y="384048"/>
+            <a:ext cx="7772400" cy="968502"/>
+          </a:xfrm>
+        </p:spPr>
+        <p:txBody>
+          <a:bodyPr/>
+          <a:lstStyle/>
+          <a:p>
+            <a:r>
+              <a:rPr lang="en-CA" dirty="0"/>
+              <a:t>Singleton</a:t>
+            </a:r>
+          </a:p>
+        </p:txBody>
+      </p:sp>
+      <p:sp>
+        <p:nvSpPr>
+          <p:cNvPr id="3" name="Content Placeholder 2"/>
+          <p:cNvSpPr>
+            <a:spLocks noGrp="1"/>
+          </p:cNvSpPr>
+          <p:nvPr>
+            <p:ph idx="1"/>
+          </p:nvPr>
+        </p:nvSpPr>
+        <p:spPr>
+          <a:xfrm>
+            <a:off x="304800" y="1428750"/>
+            <a:ext cx="8839200" cy="3337920"/>
+          </a:xfrm>
+        </p:spPr>
+        <p:txBody>
+          <a:bodyPr>
+            <a:normAutofit/>
+          </a:bodyPr>
+          <a:lstStyle/>
+          <a:p>
+            <a:r>
+              <a:rPr lang="en-CA" dirty="0"/>
+              <a:t>“static” in C++ land means the object exists all the time, and there’s only one of them</a:t>
+            </a:r>
+          </a:p>
+          <a:p>
+            <a:r>
+              <a:rPr lang="en-CA" dirty="0"/>
+              <a:t>Static variables in classes exists “before” the class is created. Or even if the class </a:t>
+            </a:r>
+            <a:r>
+              <a:rPr lang="en-CA" i="1" dirty="0"/>
+              <a:t>isn’t </a:t>
+            </a:r>
+            <a:r>
+              <a:rPr lang="en-CA" dirty="0"/>
+              <a:t>created. </a:t>
+            </a:r>
+            <a:br>
+              <a:rPr lang="en-CA" dirty="0"/>
+            </a:br>
+            <a:r>
+              <a:rPr lang="en-CA" dirty="0"/>
+              <a:t>They just exist all the time.</a:t>
+            </a:r>
+          </a:p>
+        </p:txBody>
+      </p:sp>
+      <p:sp>
+        <p:nvSpPr>
+          <p:cNvPr id="4" name="AutoShape 6"/>
+          <p:cNvSpPr>
+            <a:spLocks noChangeArrowheads="1"/>
+          </p:cNvSpPr>
+          <p:nvPr/>
+        </p:nvSpPr>
+        <p:spPr bwMode="auto">
+          <a:xfrm>
+            <a:off x="8534400" y="4800600"/>
+            <a:ext cx="609600" cy="342900"/>
+          </a:xfrm>
+          <a:prstGeom prst="rightArrow">
+            <a:avLst>
+              <a:gd name="adj1" fmla="val 50000"/>
+              <a:gd name="adj2" fmla="val 33333"/>
+            </a:avLst>
+          </a:prstGeom>
+          <a:noFill/>
+          <a:ln w="19050">
+            <a:solidFill>
+              <a:srgbClr val="969696"/>
+            </a:solidFill>
+            <a:miter lim="800000"/>
+            <a:headEnd/>
+            <a:tailEnd/>
+          </a:ln>
+        </p:spPr>
+        <p:txBody>
+          <a:bodyPr wrap="none" anchor="ctr"/>
+          <a:lstStyle/>
+          <a:p>
+            <a:endParaRPr lang="en-CA"/>
+          </a:p>
+        </p:txBody>
+      </p:sp>
+    </p:spTree>
+    <p:extLst>
+      <p:ext uri="{BB962C8B-B14F-4D97-AF65-F5344CB8AC3E}">
+        <p14:creationId xmlns:p14="http://schemas.microsoft.com/office/powerpoint/2010/main" val="717353951"/>
       </p:ext>
     </p:extLst>
   </p:cSld>

</xml_diff>